<commit_message>
words theme colors changed
</commit_message>
<xml_diff>
--- a/gemPpt/gemPpt/Created Chart.pptx
+++ b/gemPpt/gemPpt/Created Chart.pptx
@@ -1127,6 +1127,11 @@
           <a:lstStyle/>
           <a:p>
             <a:r>
+              <a:rPr>
+                <a:solidFill>
+                  <a:prstClr val="gray"/>
+                </a:solidFill>
+              </a:rPr>
               <a:t>silik yazı </a:t>
             </a:r>
           </a:p>
@@ -1293,6 +1298,11 @@
           <a:lstStyle/>
           <a:p>
             <a:r>
+              <a:rPr>
+                <a:solidFill>
+                  <a:prstClr val="gray"/>
+                </a:solidFill>
+              </a:rPr>
               <a:t>silik yazı </a:t>
             </a:r>
           </a:p>
@@ -1464,6 +1474,11 @@
           <a:lstStyle/>
           <a:p>
             <a:r>
+              <a:rPr>
+                <a:solidFill>
+                  <a:prstClr val="gray"/>
+                </a:solidFill>
+              </a:rPr>
               <a:t>silik yazı </a:t>
             </a:r>
           </a:p>
@@ -1635,6 +1650,11 @@
           <a:lstStyle/>
           <a:p>
             <a:r>
+              <a:rPr>
+                <a:solidFill>
+                  <a:prstClr val="gray"/>
+                </a:solidFill>
+              </a:rPr>
               <a:t>silik yazı </a:t>
             </a:r>
           </a:p>
@@ -1853,6 +1873,11 @@
           <a:lstStyle/>
           <a:p>
             <a:r>
+              <a:rPr>
+                <a:solidFill>
+                  <a:prstClr val="gray"/>
+                </a:solidFill>
+              </a:rPr>
               <a:t>silik yazı </a:t>
             </a:r>
           </a:p>
@@ -2071,6 +2096,11 @@
           <a:lstStyle/>
           <a:p>
             <a:r>
+              <a:rPr>
+                <a:solidFill>
+                  <a:prstClr val="gray"/>
+                </a:solidFill>
+              </a:rPr>
               <a:t>silik yazı </a:t>
             </a:r>
           </a:p>
@@ -2289,6 +2319,11 @@
           <a:lstStyle/>
           <a:p>
             <a:r>
+              <a:rPr>
+                <a:solidFill>
+                  <a:prstClr val="gray"/>
+                </a:solidFill>
+              </a:rPr>
               <a:t>silik yazı </a:t>
             </a:r>
           </a:p>
@@ -2507,6 +2542,11 @@
           <a:lstStyle/>
           <a:p>
             <a:r>
+              <a:rPr>
+                <a:solidFill>
+                  <a:prstClr val="gray"/>
+                </a:solidFill>
+              </a:rPr>
               <a:t>silik yazı </a:t>
             </a:r>
           </a:p>

</xml_diff>

<commit_message>
left graph for loop
</commit_message>
<xml_diff>
--- a/gemPpt/gemPpt/Created Chart.pptx
+++ b/gemPpt/gemPpt/Created Chart.pptx
@@ -1146,7 +1146,7 @@
         </p:nvSpPr>
         <p:spPr>
           <a:xfrm>
-            <a:off x="4320000" y="3564000"/>
+            <a:off x="4320000" y="3546000"/>
             <a:ext cx="900000" cy="180000"/>
           </a:xfrm>
           <a:prstGeom prst="rect">
@@ -1223,6 +1223,11 @@
           <a:prstGeom prst="rect">
             <a:avLst/>
           </a:prstGeom>
+          <a:ln>
+            <a:solidFill>
+              <a:prstClr val="green"/>
+            </a:solidFill>
+          </a:ln>
         </p:spPr>
         <p:style>
           <a:lnRef idx="2">
@@ -1318,8 +1323,8 @@
         </p:nvSpPr>
         <p:spPr>
           <a:xfrm>
-            <a:off x="4320000" y="4284000"/>
-            <a:ext cx="900000" cy="360000"/>
+            <a:off x="4320000" y="4266000"/>
+            <a:ext cx="900000" cy="180000"/>
           </a:xfrm>
           <a:prstGeom prst="rect">
             <a:avLst/>
@@ -1356,11 +1361,6 @@
           <a:solidFill>
             <a:prstClr val="yellow"/>
           </a:solidFill>
-          <a:ln>
-            <a:solidFill>
-              <a:prstClr val="green"/>
-            </a:solidFill>
-          </a:ln>
         </p:spPr>
         <p:style>
           <a:lnRef idx="2">
@@ -1400,6 +1400,11 @@
           <a:prstGeom prst="rect">
             <a:avLst/>
           </a:prstGeom>
+          <a:ln>
+            <a:solidFill>
+              <a:prstClr val="green"/>
+            </a:solidFill>
+          </a:ln>
         </p:spPr>
         <p:style>
           <a:lnRef idx="2">
@@ -1495,8 +1500,8 @@
         </p:nvSpPr>
         <p:spPr>
           <a:xfrm>
-            <a:off x="4320000" y="5004000"/>
-            <a:ext cx="900000" cy="360000"/>
+            <a:off x="4320000" y="4986000"/>
+            <a:ext cx="900000" cy="180000"/>
           </a:xfrm>
           <a:prstGeom prst="rect">
             <a:avLst/>
@@ -1533,11 +1538,6 @@
           <a:solidFill>
             <a:prstClr val="yellow"/>
           </a:solidFill>
-          <a:ln>
-            <a:solidFill>
-              <a:prstClr val="green"/>
-            </a:solidFill>
-          </a:ln>
         </p:spPr>
         <p:style>
           <a:lnRef idx="2">
@@ -1577,6 +1577,11 @@
           <a:prstGeom prst="rect">
             <a:avLst/>
           </a:prstGeom>
+          <a:ln>
+            <a:solidFill>
+              <a:prstClr val="green"/>
+            </a:solidFill>
+          </a:ln>
         </p:spPr>
         <p:style>
           <a:lnRef idx="2">
@@ -1672,8 +1677,8 @@
         </p:nvSpPr>
         <p:spPr>
           <a:xfrm>
-            <a:off x="4320000" y="5724000"/>
-            <a:ext cx="900000" cy="360000"/>
+            <a:off x="4320000" y="5706000"/>
+            <a:ext cx="900000" cy="180000"/>
           </a:xfrm>
           <a:prstGeom prst="rect">
             <a:avLst/>
@@ -1710,11 +1715,6 @@
           <a:solidFill>
             <a:prstClr val="yellow"/>
           </a:solidFill>
-          <a:ln>
-            <a:solidFill>
-              <a:prstClr val="green"/>
-            </a:solidFill>
-          </a:ln>
         </p:spPr>
         <p:style>
           <a:lnRef idx="2">

</xml_diff>

<commit_message>
right side for loop updated
</commit_message>
<xml_diff>
--- a/gemPpt/gemPpt/Created Chart.pptx
+++ b/gemPpt/gemPpt/Created Chart.pptx
@@ -1863,7 +1863,7 @@
         </p:nvSpPr>
         <p:spPr>
           <a:xfrm>
-            <a:off x="9000000" y="3294000"/>
+            <a:off x="8712000" y="3294000"/>
             <a:ext cx="1080000" cy="360000"/>
           </a:xfrm>
           <a:prstGeom prst="rect">
@@ -2087,7 +2087,7 @@
         </p:nvSpPr>
         <p:spPr>
           <a:xfrm>
-            <a:off x="9000000" y="4014000"/>
+            <a:off x="8712000" y="4014000"/>
             <a:ext cx="1080000" cy="360000"/>
           </a:xfrm>
           <a:prstGeom prst="rect">
@@ -2311,7 +2311,7 @@
         </p:nvSpPr>
         <p:spPr>
           <a:xfrm>
-            <a:off x="9000000" y="4734000"/>
+            <a:off x="8712000" y="4734000"/>
             <a:ext cx="1080000" cy="360000"/>
           </a:xfrm>
           <a:prstGeom prst="rect">
@@ -2535,8 +2535,8 @@
         </p:nvSpPr>
         <p:spPr>
           <a:xfrm>
-            <a:off x="9000000" y="5454000"/>
-            <a:ext cx="1080000" cy="252000"/>
+            <a:off x="8712000" y="5454000"/>
+            <a:ext cx="1080000" cy="360000"/>
           </a:xfrm>
           <a:prstGeom prst="rect">
             <a:avLst/>

</xml_diff>